<commit_message>
fix up slides, add HBase; closes #55
</commit_message>
<xml_diff>
--- a/13-databases/slides.pptx
+++ b/13-databases/slides.pptx
@@ -6,7 +6,7 @@
     <p:sldMasterId id="2147483649" r:id="rId2"/>
   </p:sldMasterIdLst>
   <p:notesMasterIdLst>
-    <p:notesMasterId r:id="rId12"/>
+    <p:notesMasterId r:id="rId11"/>
   </p:notesMasterIdLst>
   <p:sldIdLst>
     <p:sldId id="258" r:id="rId3"/>
@@ -17,7 +17,6 @@
     <p:sldId id="394" r:id="rId8"/>
     <p:sldId id="395" r:id="rId9"/>
     <p:sldId id="387" r:id="rId10"/>
-    <p:sldId id="383" r:id="rId11"/>
   </p:sldIdLst>
   <p:sldSz cx="9363075" cy="5257800"/>
   <p:notesSz cx="6858000" cy="9144000"/>
@@ -240,7 +239,7 @@
           <a:p>
             <a:fld id="{DB92F479-4B50-F243-9713-1B12EC2B4BDB}" type="datetimeFigureOut">
               <a:rPr lang="en-US" smtClean="0"/>
-              <a:t>8/10/14</a:t>
+              <a:t>8/31/14</a:t>
             </a:fld>
             <a:endParaRPr lang="en-US"/>
           </a:p>
@@ -1275,90 +1274,6 @@
             <a:fld id="{ADD4B5B7-85EF-4E48-AC80-2380FACD9C23}" type="slidenum">
               <a:rPr lang="en-US" smtClean="0"/>
               <a:t>8</a:t>
-            </a:fld>
-            <a:endParaRPr lang="en-US"/>
-          </a:p>
-        </p:txBody>
-      </p:sp>
-    </p:spTree>
-    <p:extLst>
-      <p:ext uri="{BB962C8B-B14F-4D97-AF65-F5344CB8AC3E}">
-        <p14:creationId xmlns:p14="http://schemas.microsoft.com/office/powerpoint/2010/main" val="158773868"/>
-      </p:ext>
-    </p:extLst>
-  </p:cSld>
-  <p:clrMapOvr>
-    <a:masterClrMapping/>
-  </p:clrMapOvr>
-</p:notes>
-</file>
-
-<file path=ppt/notesSlides/notesSlide9.xml><?xml version="1.0" encoding="utf-8"?>
-<p:notes xmlns:a="http://schemas.openxmlformats.org/drawingml/2006/main" xmlns:r="http://schemas.openxmlformats.org/officeDocument/2006/relationships" xmlns:p="http://schemas.openxmlformats.org/presentationml/2006/main">
-  <p:cSld>
-    <p:spTree>
-      <p:nvGrpSpPr>
-        <p:cNvPr id="1" name=""/>
-        <p:cNvGrpSpPr/>
-        <p:nvPr/>
-      </p:nvGrpSpPr>
-      <p:grpSpPr>
-        <a:xfrm>
-          <a:off x="0" y="0"/>
-          <a:ext cx="0" cy="0"/>
-          <a:chOff x="0" y="0"/>
-          <a:chExt cx="0" cy="0"/>
-        </a:xfrm>
-      </p:grpSpPr>
-      <p:sp>
-        <p:nvSpPr>
-          <p:cNvPr id="2" name="Slide Image Placeholder 1"/>
-          <p:cNvSpPr>
-            <a:spLocks noGrp="1" noRot="1" noChangeAspect="1"/>
-          </p:cNvSpPr>
-          <p:nvPr>
-            <p:ph type="sldImg"/>
-          </p:nvPr>
-        </p:nvSpPr>
-        <p:spPr/>
-      </p:sp>
-      <p:sp>
-        <p:nvSpPr>
-          <p:cNvPr id="3" name="Notes Placeholder 2"/>
-          <p:cNvSpPr>
-            <a:spLocks noGrp="1"/>
-          </p:cNvSpPr>
-          <p:nvPr>
-            <p:ph type="body" idx="1"/>
-          </p:nvPr>
-        </p:nvSpPr>
-        <p:spPr/>
-        <p:txBody>
-          <a:bodyPr/>
-          <a:lstStyle/>
-          <a:p>
-            <a:endParaRPr lang="en-US" dirty="0"/>
-          </a:p>
-        </p:txBody>
-      </p:sp>
-      <p:sp>
-        <p:nvSpPr>
-          <p:cNvPr id="4" name="Slide Number Placeholder 3"/>
-          <p:cNvSpPr>
-            <a:spLocks noGrp="1"/>
-          </p:cNvSpPr>
-          <p:nvPr>
-            <p:ph type="sldNum" sz="quarter" idx="10"/>
-          </p:nvPr>
-        </p:nvSpPr>
-        <p:spPr/>
-        <p:txBody>
-          <a:bodyPr/>
-          <a:lstStyle/>
-          <a:p>
-            <a:fld id="{ADD4B5B7-85EF-4E48-AC80-2380FACD9C23}" type="slidenum">
-              <a:rPr lang="en-US" smtClean="0"/>
-              <a:t>9</a:t>
             </a:fld>
             <a:endParaRPr lang="en-US"/>
           </a:p>
@@ -7810,18 +7725,26 @@
             </a:br>
             <a:r>
               <a:rPr lang="en-US" sz="9000" dirty="0" smtClean="0"/>
-              <a:t>DATA SCIENCE</a:t>
+              <a:t>INTRO </a:t>
+            </a:r>
+            <a:r>
+              <a:rPr lang="en-US" sz="6000" dirty="0" smtClean="0"/>
+              <a:t>TO</a:t>
+            </a:r>
+            <a:r>
+              <a:rPr lang="en-US" sz="9000" dirty="0" smtClean="0"/>
+              <a:t> DATA </a:t>
+            </a:r>
+            <a:r>
+              <a:rPr lang="en-US" sz="9000" dirty="0" smtClean="0"/>
+              <a:t>SCIENCE</a:t>
             </a:r>
             <a:br>
               <a:rPr lang="en-US" sz="9000" dirty="0" smtClean="0"/>
             </a:br>
             <a:r>
               <a:rPr lang="en-US" sz="6000" dirty="0" err="1" smtClean="0"/>
-              <a:t>data</a:t>
-            </a:r>
-            <a:r>
-              <a:rPr lang="en-US" sz="6000" dirty="0" err="1" smtClean="0"/>
-              <a:t>Bases</a:t>
+              <a:t>dataBases</a:t>
             </a:r>
             <a:endParaRPr lang="en-US" sz="6000" dirty="0"/>
           </a:p>
@@ -7948,31 +7871,7 @@
                 <a:ea typeface="ヒラギノ角ゴ ProN W6" charset="0"/>
                 <a:cs typeface="ヒラギノ角ゴ ProN W6" charset="0"/>
               </a:rPr>
-              <a:t>I</a:t>
-            </a:r>
-            <a:r>
-              <a:rPr lang="en-US" sz="3000" dirty="0" smtClean="0">
-                <a:latin typeface="PFDinTextCompPro-Bold" charset="0"/>
-                <a:ea typeface="ヒラギノ角ゴ ProN W6" charset="0"/>
-                <a:cs typeface="ヒラギノ角ゴ ProN W6" charset="0"/>
-              </a:rPr>
-              <a:t>. </a:t>
-            </a:r>
-            <a:r>
-              <a:rPr lang="en-US" sz="3000" dirty="0" smtClean="0">
-                <a:latin typeface="PFDinTextCompPro-Bold" charset="0"/>
-                <a:ea typeface="ヒラギノ角ゴ ProN W6" charset="0"/>
-                <a:cs typeface="ヒラギノ角ゴ ProN W6" charset="0"/>
-              </a:rPr>
-              <a:t>Databases</a:t>
-            </a:r>
-            <a:r>
-              <a:rPr lang="en-US" sz="3000" dirty="0" smtClean="0">
-                <a:latin typeface="PFDinTextCompPro-Bold" charset="0"/>
-                <a:ea typeface="ヒラギノ角ゴ ProN W6" charset="0"/>
-                <a:cs typeface="ヒラギノ角ゴ ProN W6" charset="0"/>
-              </a:rPr>
-              <a:t/>
+              <a:t>I. Databases</a:t>
             </a:r>
             <a:br>
               <a:rPr lang="en-US" sz="3000" dirty="0" smtClean="0">
@@ -7987,7 +7886,7 @@
                 <a:ea typeface="ヒラギノ角ゴ ProN W6" charset="0"/>
                 <a:cs typeface="ヒラギノ角ゴ ProN W6" charset="0"/>
               </a:rPr>
-              <a:t>II. </a:t>
+              <a:t>II. SQL </a:t>
             </a:r>
             <a:r>
               <a:rPr lang="en-US" sz="3000" dirty="0" smtClean="0">
@@ -7995,7 +7894,7 @@
                 <a:ea typeface="ヒラギノ角ゴ ProN W6" charset="0"/>
                 <a:cs typeface="ヒラギノ角ゴ ProN W6" charset="0"/>
               </a:rPr>
-              <a:t>SQL [LAB] [Lab]</a:t>
+              <a:t>LABs</a:t>
             </a:r>
             <a:endParaRPr lang="en-US" sz="3000" cap="none" dirty="0">
               <a:latin typeface="PFDinTextCompPro-Bold" charset="0"/>
@@ -8144,11 +8043,7 @@
             </a:pPr>
             <a:r>
               <a:rPr lang="en-US" sz="7500" dirty="0" smtClean="0"/>
-              <a:t>I. </a:t>
-            </a:r>
-            <a:r>
-              <a:rPr lang="en-US" sz="7500" dirty="0" smtClean="0"/>
-              <a:t>Databases</a:t>
+              <a:t>I. Databases</a:t>
             </a:r>
             <a:endParaRPr lang="en-US" sz="7500" dirty="0"/>
           </a:p>
@@ -8871,7 +8766,11 @@
           <a:p>
             <a:r>
               <a:rPr lang="en-US" sz="2800" dirty="0" smtClean="0"/>
-              <a:t>Serialization schemes, often on HDFS</a:t>
+              <a:t>Serialization schemes, often on </a:t>
+            </a:r>
+            <a:r>
+              <a:rPr lang="en-US" sz="2800" dirty="0" smtClean="0"/>
+              <a:t>HDFS</a:t>
             </a:r>
           </a:p>
           <a:p>
@@ -8905,7 +8804,27 @@
           <a:p>
             <a:r>
               <a:rPr lang="en-US" sz="2800" dirty="0" smtClean="0"/>
-              <a:t>Blurred Lines: Object-Relational Mapping, Cassandra, column orientation, etc.</a:t>
+              <a:t>Blurred Lines: Object-Relational Mapping, Cassandra, column orientation, </a:t>
+            </a:r>
+            <a:r>
+              <a:rPr lang="en-US" sz="2800" dirty="0" err="1" smtClean="0"/>
+              <a:t>BigTable</a:t>
+            </a:r>
+            <a:r>
+              <a:rPr lang="en-US" sz="2800" dirty="0" smtClean="0"/>
+              <a:t>/</a:t>
+            </a:r>
+            <a:r>
+              <a:rPr lang="en-US" sz="2800" dirty="0" err="1" smtClean="0"/>
+              <a:t>Hbase</a:t>
+            </a:r>
+            <a:r>
+              <a:rPr lang="en-US" sz="2800" dirty="0" smtClean="0"/>
+              <a:t>, etc</a:t>
+            </a:r>
+            <a:r>
+              <a:rPr lang="en-US" sz="2800" dirty="0" smtClean="0"/>
+              <a:t>.</a:t>
             </a:r>
           </a:p>
         </p:txBody>
@@ -9174,7 +9093,19 @@
             </a:pPr>
             <a:r>
               <a:rPr lang="en-US" sz="7500" dirty="0" smtClean="0"/>
-              <a:t>V. SQL [Lab] [Lab]</a:t>
+              <a:t>II</a:t>
+            </a:r>
+            <a:r>
+              <a:rPr lang="en-US" sz="7500" dirty="0" smtClean="0"/>
+              <a:t>. </a:t>
+            </a:r>
+            <a:r>
+              <a:rPr lang="en-US" sz="7500" dirty="0" smtClean="0"/>
+              <a:t>SQL </a:t>
+            </a:r>
+            <a:r>
+              <a:rPr lang="en-US" sz="7500" dirty="0" smtClean="0"/>
+              <a:t>Labs</a:t>
             </a:r>
             <a:endParaRPr lang="en-US" sz="7500" dirty="0"/>
           </a:p>
@@ -9225,85 +9156,6 @@
     <p:extLst>
       <p:ext uri="{BB962C8B-B14F-4D97-AF65-F5344CB8AC3E}">
         <p14:creationId xmlns:p14="http://schemas.microsoft.com/office/powerpoint/2010/main" val="1008825831"/>
-      </p:ext>
-    </p:extLst>
-  </p:cSld>
-  <p:clrMapOvr>
-    <a:masterClrMapping/>
-  </p:clrMapOvr>
-  <p:transition xmlns:p14="http://schemas.microsoft.com/office/powerpoint/2010/main"/>
-  <p:timing>
-    <p:tnLst>
-      <p:par>
-        <p:cTn xmlns:p14="http://schemas.microsoft.com/office/powerpoint/2010/main" id="1" dur="indefinite" restart="never" nodeType="tmRoot"/>
-      </p:par>
-    </p:tnLst>
-  </p:timing>
-</p:sld>
-</file>
-
-<file path=ppt/slides/slide9.xml><?xml version="1.0" encoding="utf-8"?>
-<p:sld xmlns:a="http://schemas.openxmlformats.org/drawingml/2006/main" xmlns:r="http://schemas.openxmlformats.org/officeDocument/2006/relationships" xmlns:p="http://schemas.openxmlformats.org/presentationml/2006/main">
-  <p:cSld>
-    <p:spTree>
-      <p:nvGrpSpPr>
-        <p:cNvPr id="1" name=""/>
-        <p:cNvGrpSpPr/>
-        <p:nvPr/>
-      </p:nvGrpSpPr>
-      <p:grpSpPr>
-        <a:xfrm>
-          <a:off x="0" y="0"/>
-          <a:ext cx="0" cy="0"/>
-          <a:chOff x="0" y="0"/>
-          <a:chExt cx="0" cy="0"/>
-        </a:xfrm>
-      </p:grpSpPr>
-      <p:sp>
-        <p:nvSpPr>
-          <p:cNvPr id="4" name="Content Placeholder 3"/>
-          <p:cNvSpPr>
-            <a:spLocks noGrp="1"/>
-          </p:cNvSpPr>
-          <p:nvPr>
-            <p:ph sz="quarter" idx="11"/>
-          </p:nvPr>
-        </p:nvSpPr>
-        <p:spPr>
-          <a:xfrm>
-            <a:off x="371475" y="495300"/>
-            <a:ext cx="6400800" cy="304800"/>
-          </a:xfrm>
-        </p:spPr>
-        <p:txBody>
-          <a:bodyPr wrap="square" lIns="91440" tIns="45720" rIns="91440" bIns="45720" numCol="1" anchor="t" anchorCtr="0" compatLnSpc="1">
-            <a:prstTxWarp prst="textNoShape">
-              <a:avLst/>
-            </a:prstTxWarp>
-          </a:bodyPr>
-          <a:lstStyle/>
-          <a:p>
-            <a:pPr marL="0" indent="0"/>
-            <a:r>
-              <a:rPr lang="en-US" cap="none" dirty="0" smtClean="0">
-                <a:latin typeface="PFDinTextCompPro-Bold" charset="0"/>
-                <a:ea typeface="ヒラギノ角ゴ ProN W3" charset="0"/>
-                <a:cs typeface="ヒラギノ角ゴ ProN W3" charset="0"/>
-              </a:rPr>
-              <a:t>INTRO TO DATA SCIENCE</a:t>
-            </a:r>
-            <a:endParaRPr lang="en-US" cap="none" dirty="0">
-              <a:latin typeface="PFDinTextCompPro-Bold" charset="0"/>
-              <a:ea typeface="ヒラギノ角ゴ ProN W3" charset="0"/>
-              <a:cs typeface="ヒラギノ角ゴ ProN W3" charset="0"/>
-            </a:endParaRPr>
-          </a:p>
-        </p:txBody>
-      </p:sp>
-    </p:spTree>
-    <p:extLst>
-      <p:ext uri="{BB962C8B-B14F-4D97-AF65-F5344CB8AC3E}">
-        <p14:creationId xmlns:p14="http://schemas.microsoft.com/office/powerpoint/2010/main" val="1434922006"/>
       </p:ext>
     </p:extLst>
   </p:cSld>

</xml_diff>